<commit_message>
New format of Presentation
</commit_message>
<xml_diff>
--- a/Presentation.pptx
+++ b/Presentation.pptx
@@ -123,12 +123,77 @@
 <p1510:revInfo xmlns:a="http://schemas.openxmlformats.org/drawingml/2006/main" xmlns:r="http://schemas.openxmlformats.org/officeDocument/2006/relationships" xmlns:p1510="http://schemas.microsoft.com/office/powerpoint/2015/10/main">
   <p1510:revLst>
     <p1510:client id="{63446F40-2601-4258-93D3-0645E898005C}" v="48" dt="2024-04-23T18:31:55.701"/>
+    <p1510:client id="{741949F1-FC4C-4953-9D4F-47896365079C}" v="45" dt="2024-04-23T20:57:26.947"/>
   </p1510:revLst>
 </p1510:revInfo>
 </file>
 
 <file path=ppt/changesInfos/changesInfo1.xml><?xml version="1.0" encoding="utf-8"?>
 <pc:chgInfo xmlns:a="http://schemas.openxmlformats.org/drawingml/2006/main" xmlns:r="http://schemas.openxmlformats.org/officeDocument/2006/relationships" xmlns:ac="http://schemas.microsoft.com/office/drawing/2013/main/command" xmlns:pc="http://schemas.microsoft.com/office/powerpoint/2013/main/command">
+  <pc:docChgLst>
+    <pc:chgData name="Sahar Kadkhoda Masoum Ali" userId="3d8a9fd0-7f7d-41b9-90e1-9b9a2d76abe3" providerId="ADAL" clId="{741949F1-FC4C-4953-9D4F-47896365079C}"/>
+    <pc:docChg chg="modSld">
+      <pc:chgData name="Sahar Kadkhoda Masoum Ali" userId="3d8a9fd0-7f7d-41b9-90e1-9b9a2d76abe3" providerId="ADAL" clId="{741949F1-FC4C-4953-9D4F-47896365079C}" dt="2024-04-23T20:57:26.947" v="57" actId="20577"/>
+      <pc:docMkLst>
+        <pc:docMk/>
+      </pc:docMkLst>
+      <pc:sldChg chg="modSp mod modAnim">
+        <pc:chgData name="Sahar Kadkhoda Masoum Ali" userId="3d8a9fd0-7f7d-41b9-90e1-9b9a2d76abe3" providerId="ADAL" clId="{741949F1-FC4C-4953-9D4F-47896365079C}" dt="2024-04-23T20:57:26.947" v="57" actId="20577"/>
+        <pc:sldMkLst>
+          <pc:docMk/>
+          <pc:sldMk cId="430591984" sldId="259"/>
+        </pc:sldMkLst>
+        <pc:spChg chg="mod">
+          <ac:chgData name="Sahar Kadkhoda Masoum Ali" userId="3d8a9fd0-7f7d-41b9-90e1-9b9a2d76abe3" providerId="ADAL" clId="{741949F1-FC4C-4953-9D4F-47896365079C}" dt="2024-04-23T20:55:28.883" v="18" actId="20577"/>
+          <ac:spMkLst>
+            <pc:docMk/>
+            <pc:sldMk cId="430591984" sldId="259"/>
+            <ac:spMk id="3" creationId="{AA11EDAB-A83E-6A4C-D743-2E3EDD25BE70}"/>
+          </ac:spMkLst>
+        </pc:spChg>
+        <pc:spChg chg="mod">
+          <ac:chgData name="Sahar Kadkhoda Masoum Ali" userId="3d8a9fd0-7f7d-41b9-90e1-9b9a2d76abe3" providerId="ADAL" clId="{741949F1-FC4C-4953-9D4F-47896365079C}" dt="2024-04-23T20:57:26.947" v="57" actId="20577"/>
+          <ac:spMkLst>
+            <pc:docMk/>
+            <pc:sldMk cId="430591984" sldId="259"/>
+            <ac:spMk id="10" creationId="{6B6F5C47-71C6-023D-C591-16E3B820CFF6}"/>
+          </ac:spMkLst>
+        </pc:spChg>
+        <pc:graphicFrameChg chg="mod modGraphic">
+          <ac:chgData name="Sahar Kadkhoda Masoum Ali" userId="3d8a9fd0-7f7d-41b9-90e1-9b9a2d76abe3" providerId="ADAL" clId="{741949F1-FC4C-4953-9D4F-47896365079C}" dt="2024-04-23T20:56:14.866" v="32" actId="14734"/>
+          <ac:graphicFrameMkLst>
+            <pc:docMk/>
+            <pc:sldMk cId="430591984" sldId="259"/>
+            <ac:graphicFrameMk id="8" creationId="{04E42C88-379F-AD4A-4FC0-B1CC7577B70B}"/>
+          </ac:graphicFrameMkLst>
+        </pc:graphicFrameChg>
+        <pc:picChg chg="mod">
+          <ac:chgData name="Sahar Kadkhoda Masoum Ali" userId="3d8a9fd0-7f7d-41b9-90e1-9b9a2d76abe3" providerId="ADAL" clId="{741949F1-FC4C-4953-9D4F-47896365079C}" dt="2024-04-23T20:56:20.171" v="33" actId="1076"/>
+          <ac:picMkLst>
+            <pc:docMk/>
+            <pc:sldMk cId="430591984" sldId="259"/>
+            <ac:picMk id="9" creationId="{2C9CEA45-57D3-4ADE-FE8E-C10A556E5508}"/>
+          </ac:picMkLst>
+        </pc:picChg>
+        <pc:picChg chg="mod">
+          <ac:chgData name="Sahar Kadkhoda Masoum Ali" userId="3d8a9fd0-7f7d-41b9-90e1-9b9a2d76abe3" providerId="ADAL" clId="{741949F1-FC4C-4953-9D4F-47896365079C}" dt="2024-04-23T20:56:22.786" v="34" actId="1076"/>
+          <ac:picMkLst>
+            <pc:docMk/>
+            <pc:sldMk cId="430591984" sldId="259"/>
+            <ac:picMk id="2052" creationId="{1E04AFF1-B462-160C-CCB1-579BEB029FF2}"/>
+          </ac:picMkLst>
+        </pc:picChg>
+        <pc:picChg chg="mod">
+          <ac:chgData name="Sahar Kadkhoda Masoum Ali" userId="3d8a9fd0-7f7d-41b9-90e1-9b9a2d76abe3" providerId="ADAL" clId="{741949F1-FC4C-4953-9D4F-47896365079C}" dt="2024-04-23T20:56:25.171" v="35" actId="1076"/>
+          <ac:picMkLst>
+            <pc:docMk/>
+            <pc:sldMk cId="430591984" sldId="259"/>
+            <ac:picMk id="2056" creationId="{E6796FF5-EB55-04AD-0573-D8150BEF654C}"/>
+          </ac:picMkLst>
+        </pc:picChg>
+      </pc:sldChg>
+    </pc:docChg>
+  </pc:docChgLst>
   <pc:docChgLst>
     <pc:chgData name="Sahar Kadkhoda Masoum Ali" userId="3d8a9fd0-7f7d-41b9-90e1-9b9a2d76abe3" providerId="ADAL" clId="{63446F40-2601-4258-93D3-0645E898005C}"/>
     <pc:docChg chg="custSel addSld modSld">
@@ -4994,7 +5059,27 @@
                   <a:schemeClr val="tx1"/>
                 </a:solidFill>
               </a:rPr>
-              <a:t> For both methods of feature detection 1-layer has the highest accuracy.</a:t>
+              <a:t> </a:t>
+            </a:r>
+            <a:r>
+              <a:rPr lang="nb-NO" dirty="0"/>
+              <a:t>Count </a:t>
+            </a:r>
+            <a:r>
+              <a:rPr lang="nb-NO" dirty="0" err="1"/>
+              <a:t>vectorizer</a:t>
+            </a:r>
+            <a:r>
+              <a:rPr lang="nb-NO" dirty="0"/>
+              <a:t>: 2-layers , </a:t>
+            </a:r>
+            <a:r>
+              <a:rPr lang="nb-NO" dirty="0" err="1"/>
+              <a:t>Tf_IDF</a:t>
+            </a:r>
+            <a:r>
+              <a:rPr lang="nb-NO" dirty="0"/>
+              <a:t>: 1-Layer </a:t>
             </a:r>
           </a:p>
           <a:p>
@@ -5116,14 +5201,14 @@
           <p:nvPr>
             <p:extLst>
               <p:ext uri="{D42A27DB-BD31-4B8C-83A1-F6EECF244321}">
-                <p14:modId xmlns:p14="http://schemas.microsoft.com/office/powerpoint/2010/main" val="790462729"/>
+                <p14:modId xmlns:p14="http://schemas.microsoft.com/office/powerpoint/2010/main" val="3735391259"/>
               </p:ext>
             </p:extLst>
           </p:nvPr>
         </p:nvGraphicFramePr>
         <p:xfrm>
           <a:off x="912071" y="3063870"/>
-          <a:ext cx="4880578" cy="1342008"/>
+          <a:ext cx="5097790" cy="1342008"/>
         </p:xfrm>
         <a:graphic>
           <a:graphicData uri="http://schemas.openxmlformats.org/drawingml/2006/table">
@@ -5132,28 +5217,28 @@
                 <a:tableStyleId>{5C22544A-7EE6-4342-B048-85BDC9FD1C3A}</a:tableStyleId>
               </a:tblPr>
               <a:tblGrid>
-                <a:gridCol w="1579742">
+                <a:gridCol w="1513077">
                   <a:extLst>
                     <a:ext uri="{9D8B030D-6E8A-4147-A177-3AD203B41FA5}">
                       <a16:colId xmlns:a16="http://schemas.microsoft.com/office/drawing/2014/main" val="883397328"/>
                     </a:ext>
                   </a:extLst>
                 </a:gridCol>
-                <a:gridCol w="899542">
+                <a:gridCol w="1243907">
                   <a:extLst>
                     <a:ext uri="{9D8B030D-6E8A-4147-A177-3AD203B41FA5}">
                       <a16:colId xmlns:a16="http://schemas.microsoft.com/office/drawing/2014/main" val="4092093854"/>
                     </a:ext>
                   </a:extLst>
                 </a:gridCol>
-                <a:gridCol w="1288111">
+                <a:gridCol w="1178080">
                   <a:extLst>
                     <a:ext uri="{9D8B030D-6E8A-4147-A177-3AD203B41FA5}">
                       <a16:colId xmlns:a16="http://schemas.microsoft.com/office/drawing/2014/main" val="2571597611"/>
                     </a:ext>
                   </a:extLst>
                 </a:gridCol>
-                <a:gridCol w="1113183">
+                <a:gridCol w="1162726">
                   <a:extLst>
                     <a:ext uri="{9D8B030D-6E8A-4147-A177-3AD203B41FA5}">
                       <a16:colId xmlns:a16="http://schemas.microsoft.com/office/drawing/2014/main" val="3931190801"/>
@@ -5418,6 +5503,51 @@
                           <a:ea typeface="+mn-ea"/>
                           <a:cs typeface="+mn-cs"/>
                         </a:rPr>
+                        <a:t>Softmax</a:t>
+                      </a:r>
+                      <a:endParaRPr lang="nb-NO" sz="1400" kern="1200" dirty="0">
+                        <a:solidFill>
+                          <a:schemeClr val="tx1"/>
+                        </a:solidFill>
+                        <a:latin typeface="+mn-lt"/>
+                        <a:ea typeface="+mn-ea"/>
+                        <a:cs typeface="+mn-cs"/>
+                      </a:endParaRPr>
+                    </a:p>
+                  </a:txBody>
+                  <a:tcPr/>
+                </a:tc>
+                <a:tc>
+                  <a:txBody>
+                    <a:bodyPr/>
+                    <a:lstStyle/>
+                    <a:p>
+                      <a:pPr marL="0" marR="0" lvl="0" indent="0" algn="ctr" defTabSz="457200" rtl="0" eaLnBrk="1" fontAlgn="auto" latinLnBrk="0" hangingPunct="1">
+                        <a:lnSpc>
+                          <a:spcPct val="100000"/>
+                        </a:lnSpc>
+                        <a:spcBef>
+                          <a:spcPts val="0"/>
+                        </a:spcBef>
+                        <a:spcAft>
+                          <a:spcPts val="0"/>
+                        </a:spcAft>
+                        <a:buClrTx/>
+                        <a:buSzTx/>
+                        <a:buFontTx/>
+                        <a:buNone/>
+                        <a:tabLst/>
+                        <a:defRPr/>
+                      </a:pPr>
+                      <a:r>
+                        <a:rPr lang="nb-NO" sz="1400" kern="1200" dirty="0" err="1">
+                          <a:solidFill>
+                            <a:schemeClr val="tx1"/>
+                          </a:solidFill>
+                          <a:latin typeface="+mn-lt"/>
+                          <a:ea typeface="+mn-ea"/>
+                          <a:cs typeface="+mn-cs"/>
+                        </a:rPr>
                         <a:t>Leaky</a:t>
                       </a:r>
                       <a:r>
@@ -5431,35 +5561,6 @@
                         </a:rPr>
                         <a:t> RELU</a:t>
                       </a:r>
-                    </a:p>
-                  </a:txBody>
-                  <a:tcPr/>
-                </a:tc>
-                <a:tc>
-                  <a:txBody>
-                    <a:bodyPr/>
-                    <a:lstStyle/>
-                    <a:p>
-                      <a:pPr algn="ctr"/>
-                      <a:r>
-                        <a:rPr lang="nb-NO" sz="1400" kern="1200" dirty="0" err="1">
-                          <a:solidFill>
-                            <a:schemeClr val="tx1"/>
-                          </a:solidFill>
-                          <a:latin typeface="+mn-lt"/>
-                          <a:ea typeface="+mn-ea"/>
-                          <a:cs typeface="+mn-cs"/>
-                        </a:rPr>
-                        <a:t>Softmax</a:t>
-                      </a:r>
-                      <a:endParaRPr lang="nb-NO" sz="1400" kern="1200" dirty="0">
-                        <a:solidFill>
-                          <a:schemeClr val="tx1"/>
-                        </a:solidFill>
-                        <a:latin typeface="+mn-lt"/>
-                        <a:ea typeface="+mn-ea"/>
-                        <a:cs typeface="+mn-cs"/>
-                      </a:endParaRPr>
                     </a:p>
                   </a:txBody>
                   <a:tcPr/>
@@ -5503,7 +5604,7 @@
         </p:blipFill>
         <p:spPr bwMode="auto">
           <a:xfrm>
-            <a:off x="2739334" y="3213752"/>
+            <a:off x="2942713" y="3213752"/>
             <a:ext cx="315642" cy="318125"/>
           </a:xfrm>
           <a:prstGeom prst="rect">
@@ -5550,7 +5651,7 @@
         </p:blipFill>
         <p:spPr bwMode="auto">
           <a:xfrm>
-            <a:off x="3729019" y="3213752"/>
+            <a:off x="4071025" y="3213752"/>
             <a:ext cx="320040" cy="320039"/>
           </a:xfrm>
           <a:prstGeom prst="rect">
@@ -5597,7 +5698,7 @@
         </p:blipFill>
         <p:spPr bwMode="auto">
           <a:xfrm>
-            <a:off x="5057946" y="3213752"/>
+            <a:off x="5288997" y="3213752"/>
             <a:ext cx="285034" cy="320040"/>
           </a:xfrm>
           <a:prstGeom prst="rect">
@@ -5629,7 +5730,7 @@
         </p:nvSpPr>
         <p:spPr>
           <a:xfrm>
-            <a:off x="591102" y="4632269"/>
+            <a:off x="554342" y="4651489"/>
             <a:ext cx="8933688" cy="1409617"/>
           </a:xfrm>
           <a:prstGeom prst="rect">
@@ -5771,15 +5872,7 @@
             </a:r>
             <a:r>
               <a:rPr lang="nb-NO" dirty="0"/>
-              <a:t> has more </a:t>
-            </a:r>
-            <a:r>
-              <a:rPr lang="nb-NO" dirty="0" err="1"/>
-              <a:t>than</a:t>
-            </a:r>
-            <a:r>
-              <a:rPr lang="nb-NO" dirty="0"/>
-              <a:t> 1% </a:t>
+              <a:t> </a:t>
             </a:r>
             <a:r>
               <a:rPr lang="nb-NO" dirty="0" err="1"/>
@@ -5787,11 +5880,43 @@
             </a:r>
             <a:r>
               <a:rPr lang="nb-NO" dirty="0"/>
-              <a:t> in </a:t>
+              <a:t> </a:t>
+            </a:r>
+            <a:r>
+              <a:rPr lang="nb-NO" dirty="0" err="1"/>
+              <a:t>of</a:t>
+            </a:r>
+            <a:r>
+              <a:rPr lang="nb-NO" dirty="0"/>
+              <a:t> </a:t>
+            </a:r>
+            <a:r>
+              <a:rPr lang="nb-NO" dirty="0" err="1"/>
+              <a:t>the</a:t>
+            </a:r>
+            <a:r>
+              <a:rPr lang="nb-NO" dirty="0"/>
+              <a:t> </a:t>
             </a:r>
             <a:r>
               <a:rPr lang="nb-NO" dirty="0" err="1"/>
               <a:t>accuracy</a:t>
+            </a:r>
+            <a:r>
+              <a:rPr lang="nb-NO" dirty="0"/>
+              <a:t> </a:t>
+            </a:r>
+            <a:r>
+              <a:rPr lang="nb-NO" dirty="0" err="1"/>
+              <a:t>are</a:t>
+            </a:r>
+            <a:r>
+              <a:rPr lang="nb-NO" dirty="0"/>
+              <a:t> so </a:t>
+            </a:r>
+            <a:r>
+              <a:rPr lang="nb-NO" dirty="0" err="1"/>
+              <a:t>little</a:t>
             </a:r>
             <a:r>
               <a:rPr lang="nb-NO" dirty="0"/>

</xml_diff>